<commit_message>
Fixed bug with regex.
</commit_message>
<xml_diff>
--- a/docs/Presentation.pptx
+++ b/docs/Presentation.pptx
@@ -12561,7 +12561,9 @@
         </p:nvSpPr>
         <p:spPr/>
         <p:txBody>
-          <a:bodyPr/>
+          <a:bodyPr>
+            <a:normAutofit/>
+          </a:bodyPr>
           <a:lstStyle/>
           <a:p>
             <a:r>
@@ -12572,6 +12574,15 @@
             </a:r>
           </a:p>
           <a:p>
+            <a:pPr lvl="1"/>
+            <a:r>
+              <a:rPr lang="en-US" dirty="0">
+                <a:latin typeface="Lucida Fax" panose="02060602050505020204" pitchFamily="18" charset="0"/>
+              </a:rPr>
+              <a:t>Process of computationally identifying opinions expressed in a piece of text and predicting if the attitude of a writer towards a particular topic/product is positive or negative.</a:t>
+            </a:r>
+          </a:p>
+          <a:p>
             <a:r>
               <a:rPr lang="en-US" dirty="0">
                 <a:latin typeface="Lucida Fax" panose="02060602050505020204" pitchFamily="18" charset="0"/>
@@ -12580,6 +12591,33 @@
             </a:r>
           </a:p>
           <a:p>
+            <a:pPr lvl="1"/>
+            <a:r>
+              <a:rPr lang="en-US" dirty="0">
+                <a:latin typeface="Lucida Fax" panose="02060602050505020204" pitchFamily="18" charset="0"/>
+              </a:rPr>
+              <a:t>Large user base</a:t>
+            </a:r>
+          </a:p>
+          <a:p>
+            <a:pPr lvl="1"/>
+            <a:r>
+              <a:rPr lang="en-US" dirty="0">
+                <a:latin typeface="Lucida Fax" panose="02060602050505020204" pitchFamily="18" charset="0"/>
+              </a:rPr>
+              <a:t>Diverse lexicons</a:t>
+            </a:r>
+          </a:p>
+          <a:p>
+            <a:pPr marL="457200" lvl="1" indent="0">
+              <a:buNone/>
+            </a:pPr>
+            <a:endParaRPr lang="en-US" dirty="0">
+              <a:latin typeface="Lucida Fax" panose="02060602050505020204" pitchFamily="18" charset="0"/>
+            </a:endParaRPr>
+          </a:p>
+          <a:p>
+            <a:pPr lvl="1"/>
             <a:endParaRPr lang="en-US" dirty="0">
               <a:latin typeface="Lucida Fax" panose="02060602050505020204" pitchFamily="18" charset="0"/>
             </a:endParaRPr>

</xml_diff>